<commit_message>
Mise à jour planches
</commit_message>
<xml_diff>
--- a/Gestion d’accès au batiment.pptx
+++ b/Gestion d’accès au batiment.pptx
@@ -11,6 +11,8 @@
     <p:sldId id="259" r:id="rId5"/>
     <p:sldId id="260" r:id="rId6"/>
     <p:sldId id="261" r:id="rId7"/>
+    <p:sldId id="262" r:id="rId8"/>
+    <p:sldId id="263" r:id="rId9"/>
   </p:sldIdLst>
   <p:sldSz cx="12192000" cy="6858000"/>
   <p:notesSz cx="6858000" cy="9144000"/>
@@ -109,6 +111,11 @@
       </a:defRPr>
     </a:lvl9pPr>
   </p:defaultTextStyle>
+  <p:extLst>
+    <p:ext uri="{EFAFB233-063F-42B5-8137-9DF3F51BA10A}">
+      <p15:sldGuideLst xmlns:p15="http://schemas.microsoft.com/office/powerpoint/2012/main"/>
+    </p:ext>
+  </p:extLst>
 </p:presentation>
 </file>
 
@@ -259,7 +266,7 @@
           <a:p>
             <a:fld id="{BB64556E-C8B3-4C61-A27B-B43C11DE54C9}" type="datetimeFigureOut">
               <a:rPr lang="fr-FR" smtClean="0"/>
-              <a:t>11/03/2022</a:t>
+              <a:t>18/03/2022</a:t>
             </a:fld>
             <a:endParaRPr lang="fr-FR" dirty="0"/>
           </a:p>
@@ -457,7 +464,7 @@
           <a:p>
             <a:fld id="{BB64556E-C8B3-4C61-A27B-B43C11DE54C9}" type="datetimeFigureOut">
               <a:rPr lang="fr-FR" smtClean="0"/>
-              <a:t>11/03/2022</a:t>
+              <a:t>18/03/2022</a:t>
             </a:fld>
             <a:endParaRPr lang="fr-FR" dirty="0"/>
           </a:p>
@@ -665,7 +672,7 @@
           <a:p>
             <a:fld id="{BB64556E-C8B3-4C61-A27B-B43C11DE54C9}" type="datetimeFigureOut">
               <a:rPr lang="fr-FR" smtClean="0"/>
-              <a:t>11/03/2022</a:t>
+              <a:t>18/03/2022</a:t>
             </a:fld>
             <a:endParaRPr lang="fr-FR" dirty="0"/>
           </a:p>
@@ -863,7 +870,7 @@
           <a:p>
             <a:fld id="{BB64556E-C8B3-4C61-A27B-B43C11DE54C9}" type="datetimeFigureOut">
               <a:rPr lang="fr-FR" smtClean="0"/>
-              <a:t>11/03/2022</a:t>
+              <a:t>18/03/2022</a:t>
             </a:fld>
             <a:endParaRPr lang="fr-FR" dirty="0"/>
           </a:p>
@@ -1138,7 +1145,7 @@
           <a:p>
             <a:fld id="{BB64556E-C8B3-4C61-A27B-B43C11DE54C9}" type="datetimeFigureOut">
               <a:rPr lang="fr-FR" smtClean="0"/>
-              <a:t>11/03/2022</a:t>
+              <a:t>18/03/2022</a:t>
             </a:fld>
             <a:endParaRPr lang="fr-FR" dirty="0"/>
           </a:p>
@@ -1403,7 +1410,7 @@
           <a:p>
             <a:fld id="{BB64556E-C8B3-4C61-A27B-B43C11DE54C9}" type="datetimeFigureOut">
               <a:rPr lang="fr-FR" smtClean="0"/>
-              <a:t>11/03/2022</a:t>
+              <a:t>18/03/2022</a:t>
             </a:fld>
             <a:endParaRPr lang="fr-FR" dirty="0"/>
           </a:p>
@@ -1815,7 +1822,7 @@
           <a:p>
             <a:fld id="{BB64556E-C8B3-4C61-A27B-B43C11DE54C9}" type="datetimeFigureOut">
               <a:rPr lang="fr-FR" smtClean="0"/>
-              <a:t>11/03/2022</a:t>
+              <a:t>18/03/2022</a:t>
             </a:fld>
             <a:endParaRPr lang="fr-FR" dirty="0"/>
           </a:p>
@@ -1956,7 +1963,7 @@
           <a:p>
             <a:fld id="{BB64556E-C8B3-4C61-A27B-B43C11DE54C9}" type="datetimeFigureOut">
               <a:rPr lang="fr-FR" smtClean="0"/>
-              <a:t>11/03/2022</a:t>
+              <a:t>18/03/2022</a:t>
             </a:fld>
             <a:endParaRPr lang="fr-FR" dirty="0"/>
           </a:p>
@@ -2069,7 +2076,7 @@
           <a:p>
             <a:fld id="{BB64556E-C8B3-4C61-A27B-B43C11DE54C9}" type="datetimeFigureOut">
               <a:rPr lang="fr-FR" smtClean="0"/>
-              <a:t>11/03/2022</a:t>
+              <a:t>18/03/2022</a:t>
             </a:fld>
             <a:endParaRPr lang="fr-FR" dirty="0"/>
           </a:p>
@@ -2380,7 +2387,7 @@
           <a:p>
             <a:fld id="{BB64556E-C8B3-4C61-A27B-B43C11DE54C9}" type="datetimeFigureOut">
               <a:rPr lang="fr-FR" smtClean="0"/>
-              <a:t>11/03/2022</a:t>
+              <a:t>18/03/2022</a:t>
             </a:fld>
             <a:endParaRPr lang="fr-FR" dirty="0"/>
           </a:p>
@@ -2668,7 +2675,7 @@
           <a:p>
             <a:fld id="{BB64556E-C8B3-4C61-A27B-B43C11DE54C9}" type="datetimeFigureOut">
               <a:rPr lang="fr-FR" smtClean="0"/>
-              <a:t>11/03/2022</a:t>
+              <a:t>18/03/2022</a:t>
             </a:fld>
             <a:endParaRPr lang="fr-FR" dirty="0"/>
           </a:p>
@@ -2909,7 +2916,7 @@
           <a:p>
             <a:fld id="{BB64556E-C8B3-4C61-A27B-B43C11DE54C9}" type="datetimeFigureOut">
               <a:rPr lang="fr-FR" smtClean="0"/>
-              <a:t>11/03/2022</a:t>
+              <a:t>18/03/2022</a:t>
             </a:fld>
             <a:endParaRPr lang="fr-FR" dirty="0"/>
           </a:p>
@@ -3496,9 +3503,20 @@
               <a:buAutoNum type="arabicPeriod"/>
             </a:pPr>
             <a:r>
-              <a:rPr lang="fr-FR" dirty="0"/>
+              <a:rPr lang="fr-FR" dirty="0" smtClean="0"/>
               <a:t>Composants</a:t>
             </a:r>
+          </a:p>
+          <a:p>
+            <a:pPr marL="514350" indent="-514350">
+              <a:buFont typeface="+mj-lt"/>
+              <a:buAutoNum type="arabicPeriod"/>
+            </a:pPr>
+            <a:r>
+              <a:rPr lang="fr-FR" dirty="0" smtClean="0"/>
+              <a:t>Répartition des tâches</a:t>
+            </a:r>
+            <a:endParaRPr lang="fr-FR" dirty="0"/>
           </a:p>
         </p:txBody>
       </p:sp>
@@ -3900,8 +3918,13 @@
           <a:p>
             <a:r>
               <a:rPr lang="fr-FR" dirty="0"/>
-              <a:t>TV pour l’affichage potentiel des images de vidéosurveillance, et le nombre de personne présente dans la banque.</a:t>
-            </a:r>
+              <a:t>TV pour l’affichage potentiel des images de vidéosurveillance, et le nombre de personne présente dans </a:t>
+            </a:r>
+            <a:r>
+              <a:rPr lang="fr-FR" dirty="0" smtClean="0"/>
+              <a:t>le bâtiment.</a:t>
+            </a:r>
+            <a:endParaRPr lang="fr-FR" dirty="0"/>
           </a:p>
           <a:p>
             <a:r>
@@ -3929,9 +3952,10 @@
           </a:p>
           <a:p>
             <a:r>
-              <a:rPr lang="fr-FR" dirty="0"/>
-              <a:t>Lecteur RFID</a:t>
-            </a:r>
+              <a:rPr lang="fr-FR" dirty="0" smtClean="0"/>
+              <a:t>M5Stack</a:t>
+            </a:r>
+            <a:endParaRPr lang="fr-FR" dirty="0"/>
           </a:p>
           <a:p>
             <a:r>
@@ -3960,6 +3984,192 @@
     <p:extLst>
       <p:ext uri="{BB962C8B-B14F-4D97-AF65-F5344CB8AC3E}">
         <p14:creationId xmlns:p14="http://schemas.microsoft.com/office/powerpoint/2010/main" val="999924172"/>
+      </p:ext>
+    </p:extLst>
+  </p:cSld>
+  <p:clrMapOvr>
+    <a:masterClrMapping/>
+  </p:clrMapOvr>
+</p:sld>
+</file>
+
+<file path=ppt/slides/slide7.xml><?xml version="1.0" encoding="utf-8"?>
+<p:sld xmlns:a="http://schemas.openxmlformats.org/drawingml/2006/main" xmlns:r="http://schemas.openxmlformats.org/officeDocument/2006/relationships" xmlns:p="http://schemas.openxmlformats.org/presentationml/2006/main">
+  <p:cSld>
+    <p:spTree>
+      <p:nvGrpSpPr>
+        <p:cNvPr id="1" name=""/>
+        <p:cNvGrpSpPr/>
+        <p:nvPr/>
+      </p:nvGrpSpPr>
+      <p:grpSpPr>
+        <a:xfrm>
+          <a:off x="0" y="0"/>
+          <a:ext cx="0" cy="0"/>
+          <a:chOff x="0" y="0"/>
+          <a:chExt cx="0" cy="0"/>
+        </a:xfrm>
+      </p:grpSpPr>
+      <p:sp>
+        <p:nvSpPr>
+          <p:cNvPr id="2" name="Titre 1"/>
+          <p:cNvSpPr>
+            <a:spLocks noGrp="1"/>
+          </p:cNvSpPr>
+          <p:nvPr>
+            <p:ph type="title"/>
+          </p:nvPr>
+        </p:nvSpPr>
+        <p:spPr/>
+        <p:txBody>
+          <a:bodyPr/>
+          <a:lstStyle/>
+          <a:p>
+            <a:r>
+              <a:rPr lang="fr-FR" dirty="0" smtClean="0"/>
+              <a:t>5. Répartition des tâches</a:t>
+            </a:r>
+            <a:endParaRPr lang="fr-FR" dirty="0"/>
+          </a:p>
+        </p:txBody>
+      </p:sp>
+      <p:sp>
+        <p:nvSpPr>
+          <p:cNvPr id="3" name="Espace réservé du contenu 2"/>
+          <p:cNvSpPr>
+            <a:spLocks noGrp="1"/>
+          </p:cNvSpPr>
+          <p:nvPr>
+            <p:ph idx="1"/>
+          </p:nvPr>
+        </p:nvSpPr>
+        <p:spPr/>
+        <p:txBody>
+          <a:bodyPr/>
+          <a:lstStyle/>
+          <a:p>
+            <a:r>
+              <a:rPr lang="fr-FR" dirty="0" smtClean="0"/>
+              <a:t>Saxemard:</a:t>
+            </a:r>
+            <a:r>
+              <a:rPr lang="fr-FR" dirty="0"/>
+              <a:t> </a:t>
+            </a:r>
+            <a:r>
+              <a:rPr lang="fr-FR" dirty="0" smtClean="0"/>
+              <a:t>Mise en place d’un système de création de créneau sur un agenda Google, service qui va avec, mise en place de la connexion au broker MQTT pour l’envoi des données (Code, id…)</a:t>
+            </a:r>
+          </a:p>
+          <a:p>
+            <a:r>
+              <a:rPr lang="fr-FR" dirty="0" err="1" smtClean="0"/>
+              <a:t>Pillar</a:t>
+            </a:r>
+            <a:r>
+              <a:rPr lang="fr-FR" dirty="0" smtClean="0"/>
+              <a:t> : </a:t>
+            </a:r>
+            <a:r>
+              <a:rPr lang="fr-FR" dirty="0" err="1" smtClean="0"/>
+              <a:t>NodeRed</a:t>
+            </a:r>
+            <a:r>
+              <a:rPr lang="fr-FR" dirty="0" smtClean="0"/>
+              <a:t> </a:t>
+            </a:r>
+          </a:p>
+          <a:p>
+            <a:r>
+              <a:rPr lang="fr-FR" dirty="0" err="1" smtClean="0"/>
+              <a:t>Pascucci</a:t>
+            </a:r>
+            <a:r>
+              <a:rPr lang="fr-FR" dirty="0" smtClean="0"/>
+              <a:t> : Mise en place de la base de données pour recueillir les informations provenant du M5Stack</a:t>
+            </a:r>
+          </a:p>
+        </p:txBody>
+      </p:sp>
+    </p:spTree>
+    <p:extLst>
+      <p:ext uri="{BB962C8B-B14F-4D97-AF65-F5344CB8AC3E}">
+        <p14:creationId xmlns:p14="http://schemas.microsoft.com/office/powerpoint/2010/main" val="1634119338"/>
+      </p:ext>
+    </p:extLst>
+  </p:cSld>
+  <p:clrMapOvr>
+    <a:masterClrMapping/>
+  </p:clrMapOvr>
+</p:sld>
+</file>
+
+<file path=ppt/slides/slide8.xml><?xml version="1.0" encoding="utf-8"?>
+<p:sld xmlns:a="http://schemas.openxmlformats.org/drawingml/2006/main" xmlns:r="http://schemas.openxmlformats.org/officeDocument/2006/relationships" xmlns:p="http://schemas.openxmlformats.org/presentationml/2006/main">
+  <p:cSld>
+    <p:spTree>
+      <p:nvGrpSpPr>
+        <p:cNvPr id="1" name=""/>
+        <p:cNvGrpSpPr/>
+        <p:nvPr/>
+      </p:nvGrpSpPr>
+      <p:grpSpPr>
+        <a:xfrm>
+          <a:off x="0" y="0"/>
+          <a:ext cx="0" cy="0"/>
+          <a:chOff x="0" y="0"/>
+          <a:chExt cx="0" cy="0"/>
+        </a:xfrm>
+      </p:grpSpPr>
+      <p:sp>
+        <p:nvSpPr>
+          <p:cNvPr id="2" name="Titre 1"/>
+          <p:cNvSpPr>
+            <a:spLocks noGrp="1"/>
+          </p:cNvSpPr>
+          <p:nvPr>
+            <p:ph type="title"/>
+          </p:nvPr>
+        </p:nvSpPr>
+        <p:spPr/>
+        <p:txBody>
+          <a:bodyPr/>
+          <a:lstStyle/>
+          <a:p>
+            <a:r>
+              <a:rPr lang="fr-FR" dirty="0" smtClean="0"/>
+              <a:t>6. Tâches réalisés</a:t>
+            </a:r>
+            <a:endParaRPr lang="fr-FR" dirty="0"/>
+          </a:p>
+        </p:txBody>
+      </p:sp>
+      <p:sp>
+        <p:nvSpPr>
+          <p:cNvPr id="3" name="Espace réservé du contenu 2"/>
+          <p:cNvSpPr>
+            <a:spLocks noGrp="1"/>
+          </p:cNvSpPr>
+          <p:nvPr>
+            <p:ph idx="1"/>
+          </p:nvPr>
+        </p:nvSpPr>
+        <p:spPr/>
+        <p:txBody>
+          <a:bodyPr/>
+          <a:lstStyle/>
+          <a:p>
+            <a:r>
+              <a:rPr lang="fr-FR" dirty="0" smtClean="0"/>
+              <a:t>Saxemard : Dessin de l’architecture et répartition des tâches</a:t>
+            </a:r>
+          </a:p>
+        </p:txBody>
+      </p:sp>
+    </p:spTree>
+    <p:extLst>
+      <p:ext uri="{BB962C8B-B14F-4D97-AF65-F5344CB8AC3E}">
+        <p14:creationId xmlns:p14="http://schemas.microsoft.com/office/powerpoint/2010/main" val="1847932958"/>
       </p:ext>
     </p:extLst>
   </p:cSld>

</xml_diff>